<commit_message>
Update Azure Cognitive Services PPT.pptx
</commit_message>
<xml_diff>
--- a/Azure Cognitive Services PPT.pptx
+++ b/Azure Cognitive Services PPT.pptx
@@ -5,7 +5,7 @@
     <p:sldMasterId id="2147483752" r:id="rId1"/>
   </p:sldMasterIdLst>
   <p:notesMasterIdLst>
-    <p:notesMasterId r:id="rId16"/>
+    <p:notesMasterId r:id="rId18"/>
   </p:notesMasterIdLst>
   <p:sldIdLst>
     <p:sldId id="256" r:id="rId2"/>
@@ -21,7 +21,9 @@
     <p:sldId id="271" r:id="rId12"/>
     <p:sldId id="264" r:id="rId13"/>
     <p:sldId id="270" r:id="rId14"/>
-    <p:sldId id="269" r:id="rId15"/>
+    <p:sldId id="273" r:id="rId15"/>
+    <p:sldId id="269" r:id="rId16"/>
+    <p:sldId id="272" r:id="rId17"/>
   </p:sldIdLst>
   <p:sldSz cx="12192000" cy="6858000"/>
   <p:notesSz cx="6858000" cy="9144000"/>
@@ -3519,7 +3521,7 @@
         <a:lstStyle/>
         <a:p>
           <a:r>
-            <a:rPr lang="en-US"/>
+            <a:rPr lang="en-US" dirty="0"/>
             <a:t>Speech and Text analytics cognitive service</a:t>
           </a:r>
         </a:p>
@@ -3555,7 +3557,7 @@
         <a:lstStyle/>
         <a:p>
           <a:r>
-            <a:rPr lang="en-US"/>
+            <a:rPr lang="en-US" dirty="0"/>
             <a:t>Speech Recognition via Web App</a:t>
           </a:r>
         </a:p>
@@ -3591,7 +3593,7 @@
         <a:lstStyle/>
         <a:p>
           <a:r>
-            <a:rPr lang="en-US"/>
+            <a:rPr lang="en-US" dirty="0"/>
             <a:t>Version control and deployment</a:t>
           </a:r>
         </a:p>
@@ -3627,7 +3629,7 @@
         <a:lstStyle/>
         <a:p>
           <a:r>
-            <a:rPr lang="en-US"/>
+            <a:rPr lang="en-US" dirty="0"/>
             <a:t>Building Sentiment Analysis </a:t>
           </a:r>
         </a:p>
@@ -3976,10 +3978,10 @@
         <a:lstStyle/>
         <a:p>
           <a:r>
-            <a:rPr lang="en-CA"/>
+            <a:rPr lang="en-CA" dirty="0"/>
             <a:t>Hidden Markov Model</a:t>
           </a:r>
-          <a:endParaRPr lang="en-US"/>
+          <a:endParaRPr lang="en-US" dirty="0"/>
         </a:p>
       </dgm:t>
     </dgm:pt>
@@ -4271,10 +4273,10 @@
         <a:lstStyle/>
         <a:p>
           <a:r>
-            <a:rPr lang="en-CA"/>
+            <a:rPr lang="en-CA" dirty="0"/>
             <a:t>Microsoft Account</a:t>
           </a:r>
-          <a:endParaRPr lang="en-US"/>
+          <a:endParaRPr lang="en-US" dirty="0"/>
         </a:p>
       </dgm:t>
     </dgm:pt>
@@ -4296,7 +4298,7 @@
         <a:bodyPr/>
         <a:lstStyle/>
         <a:p>
-          <a:endParaRPr lang="en-US"/>
+          <a:endParaRPr lang="en-US" dirty="0"/>
         </a:p>
       </dgm:t>
     </dgm:pt>
@@ -4308,10 +4310,10 @@
         <a:lstStyle/>
         <a:p>
           <a:r>
-            <a:rPr lang="en-CA"/>
+            <a:rPr lang="en-CA" dirty="0"/>
             <a:t>Free account</a:t>
           </a:r>
-          <a:endParaRPr lang="en-US"/>
+          <a:endParaRPr lang="en-US" dirty="0"/>
         </a:p>
       </dgm:t>
     </dgm:pt>
@@ -4333,7 +4335,7 @@
         <a:bodyPr/>
         <a:lstStyle/>
         <a:p>
-          <a:endParaRPr lang="en-US"/>
+          <a:endParaRPr lang="en-US" dirty="0"/>
         </a:p>
       </dgm:t>
     </dgm:pt>
@@ -4406,7 +4408,7 @@
         <a:bodyPr/>
         <a:lstStyle/>
         <a:p>
-          <a:endParaRPr lang="en-US"/>
+          <a:endParaRPr lang="en-US" dirty="0"/>
         </a:p>
       </dgm:t>
     </dgm:pt>
@@ -6270,10 +6272,10 @@
             <a:buNone/>
           </a:pPr>
           <a:r>
-            <a:rPr lang="en-CA" sz="2700" kern="1200"/>
+            <a:rPr lang="en-CA" sz="2700" kern="1200" dirty="0"/>
             <a:t>Microsoft Account</a:t>
           </a:r>
-          <a:endParaRPr lang="en-US" sz="2700" kern="1200"/>
+          <a:endParaRPr lang="en-US" sz="2700" kern="1200" dirty="0"/>
         </a:p>
       </dsp:txBody>
       <dsp:txXfrm>
@@ -6351,10 +6353,10 @@
             <a:buNone/>
           </a:pPr>
           <a:r>
-            <a:rPr lang="en-CA" sz="2700" kern="1200"/>
+            <a:rPr lang="en-CA" sz="2700" kern="1200" dirty="0"/>
             <a:t>Free account</a:t>
           </a:r>
-          <a:endParaRPr lang="en-US" sz="2700" kern="1200"/>
+          <a:endParaRPr lang="en-US" sz="2700" kern="1200" dirty="0"/>
         </a:p>
       </dsp:txBody>
       <dsp:txXfrm>
@@ -6595,7 +6597,7 @@
             </a:spcAft>
             <a:buNone/>
           </a:pPr>
-          <a:endParaRPr lang="en-US" sz="1800" kern="1200"/>
+          <a:endParaRPr lang="en-US" sz="1800" kern="1200" dirty="0"/>
         </a:p>
       </dsp:txBody>
       <dsp:txXfrm>
@@ -6675,7 +6677,7 @@
             </a:spcAft>
             <a:buNone/>
           </a:pPr>
-          <a:endParaRPr lang="en-US" sz="1800" kern="1200"/>
+          <a:endParaRPr lang="en-US" sz="1800" kern="1200" dirty="0"/>
         </a:p>
       </dsp:txBody>
       <dsp:txXfrm>
@@ -6755,7 +6757,7 @@
             </a:spcAft>
             <a:buNone/>
           </a:pPr>
-          <a:endParaRPr lang="en-US" sz="1800" kern="1200"/>
+          <a:endParaRPr lang="en-US" sz="1800" kern="1200" dirty="0"/>
         </a:p>
       </dsp:txBody>
       <dsp:txXfrm>
@@ -14478,7 +14480,7 @@
           <a:p>
             <a:fld id="{D5AC248F-0B3A-40B9-9F79-AF4B0C7B0F8D}" type="datetimeFigureOut">
               <a:rPr lang="en-CA" smtClean="0"/>
-              <a:t>2020-07-17</a:t>
+              <a:t>2020-07-19</a:t>
             </a:fld>
             <a:endParaRPr lang="en-CA" dirty="0"/>
           </a:p>
@@ -14861,6 +14863,174 @@
     <p:extLst>
       <p:ext uri="{BB962C8B-B14F-4D97-AF65-F5344CB8AC3E}">
         <p14:creationId xmlns:p14="http://schemas.microsoft.com/office/powerpoint/2010/main" val="179597938"/>
+      </p:ext>
+    </p:extLst>
+  </p:cSld>
+  <p:clrMapOvr>
+    <a:masterClrMapping/>
+  </p:clrMapOvr>
+</p:notes>
+</file>
+
+<file path=ppt/notesSlides/notesSlide10.xml><?xml version="1.0" encoding="utf-8"?>
+<p:notes xmlns:a="http://schemas.openxmlformats.org/drawingml/2006/main" xmlns:r="http://schemas.openxmlformats.org/officeDocument/2006/relationships" xmlns:p="http://schemas.openxmlformats.org/presentationml/2006/main">
+  <p:cSld>
+    <p:spTree>
+      <p:nvGrpSpPr>
+        <p:cNvPr id="1" name=""/>
+        <p:cNvGrpSpPr/>
+        <p:nvPr/>
+      </p:nvGrpSpPr>
+      <p:grpSpPr>
+        <a:xfrm>
+          <a:off x="0" y="0"/>
+          <a:ext cx="0" cy="0"/>
+          <a:chOff x="0" y="0"/>
+          <a:chExt cx="0" cy="0"/>
+        </a:xfrm>
+      </p:grpSpPr>
+      <p:sp>
+        <p:nvSpPr>
+          <p:cNvPr id="2" name="Slide Image Placeholder 1"/>
+          <p:cNvSpPr>
+            <a:spLocks noGrp="1" noRot="1" noChangeAspect="1"/>
+          </p:cNvSpPr>
+          <p:nvPr>
+            <p:ph type="sldImg"/>
+          </p:nvPr>
+        </p:nvSpPr>
+        <p:spPr/>
+      </p:sp>
+      <p:sp>
+        <p:nvSpPr>
+          <p:cNvPr id="3" name="Notes Placeholder 2"/>
+          <p:cNvSpPr>
+            <a:spLocks noGrp="1"/>
+          </p:cNvSpPr>
+          <p:nvPr>
+            <p:ph type="body" idx="1"/>
+          </p:nvPr>
+        </p:nvSpPr>
+        <p:spPr/>
+        <p:txBody>
+          <a:bodyPr/>
+          <a:lstStyle/>
+          <a:p>
+            <a:endParaRPr lang="en-CA" dirty="0"/>
+          </a:p>
+        </p:txBody>
+      </p:sp>
+      <p:sp>
+        <p:nvSpPr>
+          <p:cNvPr id="4" name="Slide Number Placeholder 3"/>
+          <p:cNvSpPr>
+            <a:spLocks noGrp="1"/>
+          </p:cNvSpPr>
+          <p:nvPr>
+            <p:ph type="sldNum" sz="quarter" idx="5"/>
+          </p:nvPr>
+        </p:nvSpPr>
+        <p:spPr/>
+        <p:txBody>
+          <a:bodyPr/>
+          <a:lstStyle/>
+          <a:p>
+            <a:fld id="{F6DC0C3D-0011-4C06-9994-60E2030D1D7C}" type="slidenum">
+              <a:rPr lang="en-CA" smtClean="0"/>
+              <a:t>14</a:t>
+            </a:fld>
+            <a:endParaRPr lang="en-CA" dirty="0"/>
+          </a:p>
+        </p:txBody>
+      </p:sp>
+    </p:spTree>
+    <p:extLst>
+      <p:ext uri="{BB962C8B-B14F-4D97-AF65-F5344CB8AC3E}">
+        <p14:creationId xmlns:p14="http://schemas.microsoft.com/office/powerpoint/2010/main" val="3144247011"/>
+      </p:ext>
+    </p:extLst>
+  </p:cSld>
+  <p:clrMapOvr>
+    <a:masterClrMapping/>
+  </p:clrMapOvr>
+</p:notes>
+</file>
+
+<file path=ppt/notesSlides/notesSlide11.xml><?xml version="1.0" encoding="utf-8"?>
+<p:notes xmlns:a="http://schemas.openxmlformats.org/drawingml/2006/main" xmlns:r="http://schemas.openxmlformats.org/officeDocument/2006/relationships" xmlns:p="http://schemas.openxmlformats.org/presentationml/2006/main">
+  <p:cSld>
+    <p:spTree>
+      <p:nvGrpSpPr>
+        <p:cNvPr id="1" name=""/>
+        <p:cNvGrpSpPr/>
+        <p:nvPr/>
+      </p:nvGrpSpPr>
+      <p:grpSpPr>
+        <a:xfrm>
+          <a:off x="0" y="0"/>
+          <a:ext cx="0" cy="0"/>
+          <a:chOff x="0" y="0"/>
+          <a:chExt cx="0" cy="0"/>
+        </a:xfrm>
+      </p:grpSpPr>
+      <p:sp>
+        <p:nvSpPr>
+          <p:cNvPr id="2" name="Slide Image Placeholder 1"/>
+          <p:cNvSpPr>
+            <a:spLocks noGrp="1" noRot="1" noChangeAspect="1"/>
+          </p:cNvSpPr>
+          <p:nvPr>
+            <p:ph type="sldImg"/>
+          </p:nvPr>
+        </p:nvSpPr>
+        <p:spPr/>
+      </p:sp>
+      <p:sp>
+        <p:nvSpPr>
+          <p:cNvPr id="3" name="Notes Placeholder 2"/>
+          <p:cNvSpPr>
+            <a:spLocks noGrp="1"/>
+          </p:cNvSpPr>
+          <p:nvPr>
+            <p:ph type="body" idx="1"/>
+          </p:nvPr>
+        </p:nvSpPr>
+        <p:spPr/>
+        <p:txBody>
+          <a:bodyPr/>
+          <a:lstStyle/>
+          <a:p>
+            <a:endParaRPr lang="en-CA" dirty="0"/>
+          </a:p>
+        </p:txBody>
+      </p:sp>
+      <p:sp>
+        <p:nvSpPr>
+          <p:cNvPr id="4" name="Slide Number Placeholder 3"/>
+          <p:cNvSpPr>
+            <a:spLocks noGrp="1"/>
+          </p:cNvSpPr>
+          <p:nvPr>
+            <p:ph type="sldNum" sz="quarter" idx="5"/>
+          </p:nvPr>
+        </p:nvSpPr>
+        <p:spPr/>
+        <p:txBody>
+          <a:bodyPr/>
+          <a:lstStyle/>
+          <a:p>
+            <a:fld id="{F6DC0C3D-0011-4C06-9994-60E2030D1D7C}" type="slidenum">
+              <a:rPr lang="en-CA" smtClean="0"/>
+              <a:t>16</a:t>
+            </a:fld>
+            <a:endParaRPr lang="en-CA" dirty="0"/>
+          </a:p>
+        </p:txBody>
+      </p:sp>
+    </p:spTree>
+    <p:extLst>
+      <p:ext uri="{BB962C8B-B14F-4D97-AF65-F5344CB8AC3E}">
+        <p14:creationId xmlns:p14="http://schemas.microsoft.com/office/powerpoint/2010/main" val="4128646900"/>
       </p:ext>
     </p:extLst>
   </p:cSld>
@@ -15846,7 +16016,7 @@
           <a:p>
             <a:fld id="{72EA7947-E287-4738-8C82-07CE4F01EF03}" type="datetime2">
               <a:rPr lang="en-US" smtClean="0"/>
-              <a:t>Friday, July 17, 2020</a:t>
+              <a:t>Sunday, July 19, 2020</a:t>
             </a:fld>
             <a:endParaRPr lang="en-US" dirty="0"/>
           </a:p>
@@ -16882,7 +17052,7 @@
           <a:p>
             <a:fld id="{EE2EBD84-71F4-4271-8C46-0D47C0A9B12E}" type="datetime2">
               <a:rPr lang="en-US" smtClean="0"/>
-              <a:t>Friday, July 17, 2020</a:t>
+              <a:t>Sunday, July 19, 2020</a:t>
             </a:fld>
             <a:endParaRPr lang="en-US" dirty="0"/>
           </a:p>
@@ -17093,7 +17263,7 @@
           <a:p>
             <a:fld id="{ABAE0CE1-F450-4107-B2CB-17B18F8A3F4A}" type="datetime2">
               <a:rPr lang="en-US" smtClean="0"/>
-              <a:t>Friday, July 17, 2020</a:t>
+              <a:t>Sunday, July 19, 2020</a:t>
             </a:fld>
             <a:endParaRPr lang="en-US" dirty="0"/>
           </a:p>
@@ -17758,7 +17928,7 @@
           <a:p>
             <a:fld id="{6FE8C025-CD7A-4966-867E-81CF82B15267}" type="datetime2">
               <a:rPr lang="en-US" smtClean="0"/>
-              <a:t>Friday, July 17, 2020</a:t>
+              <a:t>Sunday, July 19, 2020</a:t>
             </a:fld>
             <a:endParaRPr lang="en-US" dirty="0"/>
           </a:p>
@@ -18378,7 +18548,7 @@
           <a:p>
             <a:fld id="{FE809929-0719-4517-94D6-FDF7F99E70F6}" type="datetime2">
               <a:rPr lang="en-US" smtClean="0"/>
-              <a:t>Friday, July 17, 2020</a:t>
+              <a:t>Sunday, July 19, 2020</a:t>
             </a:fld>
             <a:endParaRPr lang="en-US" dirty="0"/>
           </a:p>
@@ -19496,7 +19666,7 @@
           <a:p>
             <a:fld id="{20E95673-5512-4AAA-9AEB-E00C61EC65D5}" type="datetime2">
               <a:rPr lang="en-US" smtClean="0"/>
-              <a:t>Friday, July 17, 2020</a:t>
+              <a:t>Sunday, July 19, 2020</a:t>
             </a:fld>
             <a:endParaRPr lang="en-US" dirty="0"/>
           </a:p>
@@ -20043,7 +20213,7 @@
           <a:p>
             <a:fld id="{C13138FA-2E87-4873-8BBA-13E447C9A99A}" type="datetime2">
               <a:rPr lang="en-US" smtClean="0"/>
-              <a:t>Friday, July 17, 2020</a:t>
+              <a:t>Sunday, July 19, 2020</a:t>
             </a:fld>
             <a:endParaRPr lang="en-US" dirty="0"/>
           </a:p>
@@ -20204,7 +20374,7 @@
           <a:p>
             <a:fld id="{D75BB40A-97BD-4BFB-B639-0BFF95FDE8B7}" type="datetime2">
               <a:rPr lang="en-US" smtClean="0"/>
-              <a:t>Friday, July 17, 2020</a:t>
+              <a:t>Sunday, July 19, 2020</a:t>
             </a:fld>
             <a:endParaRPr lang="en-US" dirty="0"/>
           </a:p>
@@ -21239,7 +21409,7 @@
           <a:p>
             <a:fld id="{9EE9E0E3-ECF6-4CFE-8698-AEFEBCECC3C0}" type="datetime2">
               <a:rPr lang="en-US" smtClean="0"/>
-              <a:t>Friday, July 17, 2020</a:t>
+              <a:t>Sunday, July 19, 2020</a:t>
             </a:fld>
             <a:endParaRPr lang="en-US" dirty="0"/>
           </a:p>
@@ -21885,7 +22055,7 @@
           <a:p>
             <a:fld id="{251462FC-960E-4740-921F-B36862979F21}" type="datetime2">
               <a:rPr lang="en-US" smtClean="0"/>
-              <a:t>Friday, July 17, 2020</a:t>
+              <a:t>Sunday, July 19, 2020</a:t>
             </a:fld>
             <a:endParaRPr lang="en-US" dirty="0"/>
           </a:p>
@@ -22648,7 +22818,7 @@
           <a:p>
             <a:fld id="{E50BC9E2-CB44-4C05-9BB5-496C18A241E0}" type="datetime2">
               <a:rPr lang="en-US" smtClean="0"/>
-              <a:t>Friday, July 17, 2020</a:t>
+              <a:t>Sunday, July 19, 2020</a:t>
             </a:fld>
             <a:endParaRPr lang="en-US" dirty="0"/>
           </a:p>
@@ -22901,7 +23071,7 @@
           <a:p>
             <a:fld id="{246CB39B-5F4C-4A7E-9BE3-AAFD45576D16}" type="datetime2">
               <a:rPr lang="en-US" smtClean="0"/>
-              <a:t>Friday, July 17, 2020</a:t>
+              <a:t>Sunday, July 19, 2020</a:t>
             </a:fld>
             <a:endParaRPr lang="en-US" dirty="0"/>
           </a:p>
@@ -23811,7 +23981,7 @@
           </a:bodyPr>
           <a:lstStyle/>
           <a:p>
-            <a:endParaRPr lang="en-US"/>
+            <a:endParaRPr lang="en-US" dirty="0"/>
           </a:p>
         </p:txBody>
       </p:sp>
@@ -25794,6 +25964,204 @@
       </p:grpSpPr>
       <p:sp>
         <p:nvSpPr>
+          <p:cNvPr id="2" name="Title 1">
+            <a:extLst>
+              <a:ext uri="{FF2B5EF4-FFF2-40B4-BE49-F238E27FC236}">
+                <a16:creationId xmlns:a16="http://schemas.microsoft.com/office/drawing/2014/main" id="{DA8A3497-558C-4C89-8C1F-3470AFA3403A}"/>
+              </a:ext>
+            </a:extLst>
+          </p:cNvPr>
+          <p:cNvSpPr>
+            <a:spLocks noGrp="1"/>
+          </p:cNvSpPr>
+          <p:nvPr>
+            <p:ph type="title"/>
+          </p:nvPr>
+        </p:nvSpPr>
+        <p:spPr/>
+        <p:txBody>
+          <a:bodyPr/>
+          <a:lstStyle/>
+          <a:p>
+            <a:pPr algn="ctr"/>
+            <a:r>
+              <a:rPr lang="en-US" i="1" dirty="0"/>
+              <a:t>Need Help </a:t>
+            </a:r>
+            <a:r>
+              <a:rPr lang="en-US" sz="6000" dirty="0">
+                <a:solidFill>
+                  <a:schemeClr val="accent2"/>
+                </a:solidFill>
+              </a:rPr>
+              <a:t>?</a:t>
+            </a:r>
+          </a:p>
+        </p:txBody>
+      </p:sp>
+      <p:sp>
+        <p:nvSpPr>
+          <p:cNvPr id="3" name="Content Placeholder 2">
+            <a:extLst>
+              <a:ext uri="{FF2B5EF4-FFF2-40B4-BE49-F238E27FC236}">
+                <a16:creationId xmlns:a16="http://schemas.microsoft.com/office/drawing/2014/main" id="{9954CE75-BF20-46D4-96AC-F512EEE0FE5D}"/>
+              </a:ext>
+            </a:extLst>
+          </p:cNvPr>
+          <p:cNvSpPr>
+            <a:spLocks noGrp="1"/>
+          </p:cNvSpPr>
+          <p:nvPr>
+            <p:ph idx="1"/>
+          </p:nvPr>
+        </p:nvSpPr>
+        <p:spPr>
+          <a:xfrm>
+            <a:off x="339365" y="2113199"/>
+            <a:ext cx="11301772" cy="3979625"/>
+          </a:xfrm>
+        </p:spPr>
+        <p:txBody>
+          <a:bodyPr/>
+          <a:lstStyle/>
+          <a:p>
+            <a:r>
+              <a:rPr lang="en-US" dirty="0">
+                <a:solidFill>
+                  <a:schemeClr val="tx1"/>
+                </a:solidFill>
+              </a:rPr>
+              <a:t>Website:  </a:t>
+            </a:r>
+            <a:r>
+              <a:rPr lang="en-US" dirty="0">
+                <a:solidFill>
+                  <a:schemeClr val="accent1"/>
+                </a:solidFill>
+                <a:hlinkClick r:id="rId3">
+                  <a:extLst>
+                    <a:ext uri="{A12FA001-AC4F-418D-AE19-62706E023703}">
+                      <ahyp:hlinkClr xmlns:ahyp="http://schemas.microsoft.com/office/drawing/2018/hyperlinkcolor" val="tx"/>
+                    </a:ext>
+                  </a:extLst>
+                </a:hlinkClick>
+              </a:rPr>
+              <a:t>https://swadeshmisra2020.wixsite.com/broadview/training </a:t>
+            </a:r>
+            <a:endParaRPr lang="en-US" dirty="0">
+              <a:solidFill>
+                <a:schemeClr val="accent1"/>
+              </a:solidFill>
+            </a:endParaRPr>
+          </a:p>
+          <a:p>
+            <a:endParaRPr lang="en-US" dirty="0">
+              <a:solidFill>
+                <a:schemeClr val="tx1"/>
+              </a:solidFill>
+            </a:endParaRPr>
+          </a:p>
+          <a:p>
+            <a:r>
+              <a:rPr lang="en-US" dirty="0">
+                <a:solidFill>
+                  <a:schemeClr val="tx1"/>
+                </a:solidFill>
+              </a:rPr>
+              <a:t>Contact Us:</a:t>
+            </a:r>
+          </a:p>
+          <a:p>
+            <a:pPr lvl="1">
+              <a:buFont typeface="Wingdings" panose="05000000000000000000" pitchFamily="2" charset="2"/>
+              <a:buChar char="Ø"/>
+            </a:pPr>
+            <a:r>
+              <a:rPr lang="en-US" sz="2400" dirty="0">
+                <a:solidFill>
+                  <a:schemeClr val="tx1"/>
+                </a:solidFill>
+              </a:rPr>
+              <a:t>  Meghna Verma -  </a:t>
+            </a:r>
+            <a:r>
+              <a:rPr lang="en-US" sz="2400" dirty="0">
+                <a:solidFill>
+                  <a:schemeClr val="accent1"/>
+                </a:solidFill>
+              </a:rPr>
+              <a:t>19mv6@queenus.ca</a:t>
+            </a:r>
+          </a:p>
+          <a:p>
+            <a:pPr lvl="1">
+              <a:buFont typeface="Wingdings" panose="05000000000000000000" pitchFamily="2" charset="2"/>
+              <a:buChar char="Ø"/>
+            </a:pPr>
+            <a:r>
+              <a:rPr lang="en-US" sz="2400" dirty="0">
+                <a:solidFill>
+                  <a:schemeClr val="tx1"/>
+                </a:solidFill>
+              </a:rPr>
+              <a:t>  Swadesh Misra -  </a:t>
+            </a:r>
+            <a:r>
+              <a:rPr lang="en-US" sz="2400" dirty="0">
+                <a:solidFill>
+                  <a:schemeClr val="accent1"/>
+                </a:solidFill>
+              </a:rPr>
+              <a:t>swadesh.misra@queensu.ca  </a:t>
+            </a:r>
+          </a:p>
+          <a:p>
+            <a:pPr marL="457200" lvl="1" indent="0">
+              <a:buNone/>
+            </a:pPr>
+            <a:r>
+              <a:rPr lang="en-US" sz="2400" dirty="0">
+                <a:solidFill>
+                  <a:schemeClr val="tx1"/>
+                </a:solidFill>
+              </a:rPr>
+              <a:t>                                        </a:t>
+            </a:r>
+          </a:p>
+        </p:txBody>
+      </p:sp>
+    </p:spTree>
+    <p:extLst>
+      <p:ext uri="{BB962C8B-B14F-4D97-AF65-F5344CB8AC3E}">
+        <p14:creationId xmlns:p14="http://schemas.microsoft.com/office/powerpoint/2010/main" val="2510495650"/>
+      </p:ext>
+    </p:extLst>
+  </p:cSld>
+  <p:clrMapOvr>
+    <a:masterClrMapping/>
+  </p:clrMapOvr>
+</p:sld>
+</file>
+
+<file path=ppt/slides/slide15.xml><?xml version="1.0" encoding="utf-8"?>
+<p:sld xmlns:a="http://schemas.openxmlformats.org/drawingml/2006/main" xmlns:r="http://schemas.openxmlformats.org/officeDocument/2006/relationships" xmlns:p="http://schemas.openxmlformats.org/presentationml/2006/main">
+  <p:cSld>
+    <p:spTree>
+      <p:nvGrpSpPr>
+        <p:cNvPr id="1" name=""/>
+        <p:cNvGrpSpPr/>
+        <p:nvPr/>
+      </p:nvGrpSpPr>
+      <p:grpSpPr>
+        <a:xfrm>
+          <a:off x="0" y="0"/>
+          <a:ext cx="0" cy="0"/>
+          <a:chOff x="0" y="0"/>
+          <a:chExt cx="0" cy="0"/>
+        </a:xfrm>
+      </p:grpSpPr>
+      <p:sp>
+        <p:nvSpPr>
           <p:cNvPr id="3" name="Cloud 2">
             <a:extLst>
               <a:ext uri="{FF2B5EF4-FFF2-40B4-BE49-F238E27FC236}">
@@ -25876,6 +26244,1266 @@
     <p:extLst>
       <p:ext uri="{BB962C8B-B14F-4D97-AF65-F5344CB8AC3E}">
         <p14:creationId xmlns:p14="http://schemas.microsoft.com/office/powerpoint/2010/main" val="3301802454"/>
+      </p:ext>
+    </p:extLst>
+  </p:cSld>
+  <p:clrMapOvr>
+    <a:masterClrMapping/>
+  </p:clrMapOvr>
+</p:sld>
+</file>
+
+<file path=ppt/slides/slide16.xml><?xml version="1.0" encoding="utf-8"?>
+<p:sld xmlns:a="http://schemas.openxmlformats.org/drawingml/2006/main" xmlns:r="http://schemas.openxmlformats.org/officeDocument/2006/relationships" xmlns:p="http://schemas.openxmlformats.org/presentationml/2006/main">
+  <p:cSld>
+    <p:bg>
+      <p:bgPr>
+        <a:solidFill>
+          <a:schemeClr val="bg2"/>
+        </a:solidFill>
+        <a:effectLst/>
+      </p:bgPr>
+    </p:bg>
+    <p:spTree>
+      <p:nvGrpSpPr>
+        <p:cNvPr id="1" name=""/>
+        <p:cNvGrpSpPr/>
+        <p:nvPr/>
+      </p:nvGrpSpPr>
+      <p:grpSpPr>
+        <a:xfrm>
+          <a:off x="0" y="0"/>
+          <a:ext cx="0" cy="0"/>
+          <a:chOff x="0" y="0"/>
+          <a:chExt cx="0" cy="0"/>
+        </a:xfrm>
+      </p:grpSpPr>
+      <p:sp>
+        <p:nvSpPr>
+          <p:cNvPr id="8" name="Freeform: Shape 7">
+            <a:extLst>
+              <a:ext uri="{FF2B5EF4-FFF2-40B4-BE49-F238E27FC236}">
+                <a16:creationId xmlns:a16="http://schemas.microsoft.com/office/drawing/2014/main" id="{82184FF4-7029-4ED7-813A-192E60608764}"/>
+              </a:ext>
+              <a:ext uri="{C183D7F6-B498-43B3-948B-1728B52AA6E4}">
+                <adec:decorative xmlns:adec="http://schemas.microsoft.com/office/drawing/2017/decorative" val="1"/>
+              </a:ext>
+            </a:extLst>
+          </p:cNvPr>
+          <p:cNvSpPr>
+            <a:spLocks noGrp="1" noRot="1" noChangeAspect="1" noMove="1" noResize="1" noEditPoints="1" noAdjustHandles="1" noChangeArrowheads="1" noChangeShapeType="1" noTextEdit="1"/>
+          </p:cNvSpPr>
+          <p:nvPr>
+            <p:extLst>
+              <p:ext uri="{386F3935-93C4-4BCD-93E2-E3B085C9AB24}">
+                <p16:designElem xmlns:p16="http://schemas.microsoft.com/office/powerpoint/2015/main" val="1"/>
+              </p:ext>
+            </p:extLst>
+          </p:nvPr>
+        </p:nvSpPr>
+        <p:spPr>
+          <a:xfrm rot="2700000">
+            <a:off x="612445" y="481888"/>
+            <a:ext cx="1080000" cy="1262947"/>
+          </a:xfrm>
+          <a:custGeom>
+            <a:avLst/>
+            <a:gdLst/>
+            <a:ahLst/>
+            <a:cxnLst/>
+            <a:rect l="l" t="t" r="r" b="b"/>
+            <a:pathLst>
+              <a:path w="1080000" h="1262947">
+                <a:moveTo>
+                  <a:pt x="540000" y="0"/>
+                </a:moveTo>
+                <a:lnTo>
+                  <a:pt x="1064374" y="931034"/>
+                </a:lnTo>
+                <a:lnTo>
+                  <a:pt x="1069029" y="938533"/>
+                </a:lnTo>
+                <a:cubicBezTo>
+                  <a:pt x="1076223" y="956109"/>
+                  <a:pt x="1080000" y="974307"/>
+                  <a:pt x="1080000" y="992947"/>
+                </a:cubicBezTo>
+                <a:cubicBezTo>
+                  <a:pt x="1080000" y="1142064"/>
+                  <a:pt x="838234" y="1262947"/>
+                  <a:pt x="540000" y="1262947"/>
+                </a:cubicBezTo>
+                <a:cubicBezTo>
+                  <a:pt x="241766" y="1262947"/>
+                  <a:pt x="0" y="1142064"/>
+                  <a:pt x="0" y="992947"/>
+                </a:cubicBezTo>
+                <a:cubicBezTo>
+                  <a:pt x="0" y="974307"/>
+                  <a:pt x="3778" y="956109"/>
+                  <a:pt x="10971" y="938533"/>
+                </a:cubicBezTo>
+                <a:lnTo>
+                  <a:pt x="15626" y="931034"/>
+                </a:lnTo>
+                <a:lnTo>
+                  <a:pt x="540000" y="0"/>
+                </a:lnTo>
+                <a:close/>
+              </a:path>
+            </a:pathLst>
+          </a:custGeom>
+          <a:gradFill>
+            <a:gsLst>
+              <a:gs pos="60000">
+                <a:schemeClr val="bg2">
+                  <a:lumMod val="90000"/>
+                  <a:lumOff val="10000"/>
+                </a:schemeClr>
+              </a:gs>
+              <a:gs pos="30000">
+                <a:schemeClr val="bg2">
+                  <a:lumMod val="90000"/>
+                  <a:lumOff val="10000"/>
+                </a:schemeClr>
+              </a:gs>
+              <a:gs pos="40000">
+                <a:schemeClr val="bg2">
+                  <a:lumMod val="75000"/>
+                  <a:lumOff val="25000"/>
+                </a:schemeClr>
+              </a:gs>
+              <a:gs pos="100000">
+                <a:schemeClr val="bg2"/>
+              </a:gs>
+            </a:gsLst>
+            <a:lin ang="600000" scaled="0"/>
+          </a:gradFill>
+          <a:ln>
+            <a:noFill/>
+          </a:ln>
+          <a:effectLst>
+            <a:innerShdw blurRad="254000" dist="101600" dir="2700000">
+              <a:schemeClr val="accent1">
+                <a:lumMod val="60000"/>
+                <a:lumOff val="40000"/>
+                <a:alpha val="40000"/>
+              </a:schemeClr>
+            </a:innerShdw>
+          </a:effectLst>
+        </p:spPr>
+        <p:style>
+          <a:lnRef idx="2">
+            <a:schemeClr val="accent1">
+              <a:shade val="50000"/>
+            </a:schemeClr>
+          </a:lnRef>
+          <a:fillRef idx="1">
+            <a:schemeClr val="accent1"/>
+          </a:fillRef>
+          <a:effectRef idx="0">
+            <a:schemeClr val="accent1"/>
+          </a:effectRef>
+          <a:fontRef idx="minor">
+            <a:schemeClr val="lt1"/>
+          </a:fontRef>
+        </p:style>
+        <p:txBody>
+          <a:bodyPr rot="0" spcFirstLastPara="0" vertOverflow="overflow" horzOverflow="overflow" vert="horz" wrap="square" lIns="91440" tIns="45720" rIns="91440" bIns="45720" numCol="1" spcCol="0" rtlCol="0" fromWordArt="0" anchor="ctr" anchorCtr="0" forceAA="0" compatLnSpc="1">
+            <a:prstTxWarp prst="textNoShape">
+              <a:avLst/>
+            </a:prstTxWarp>
+            <a:noAutofit/>
+          </a:bodyPr>
+          <a:lstStyle/>
+          <a:p>
+            <a:pPr algn="ctr"/>
+            <a:endParaRPr lang="en-US"/>
+          </a:p>
+        </p:txBody>
+      </p:sp>
+      <p:sp>
+        <p:nvSpPr>
+          <p:cNvPr id="10" name="Oval 9">
+            <a:extLst>
+              <a:ext uri="{FF2B5EF4-FFF2-40B4-BE49-F238E27FC236}">
+                <a16:creationId xmlns:a16="http://schemas.microsoft.com/office/drawing/2014/main" id="{AAA7AB09-557C-41AD-9113-FF9F68FA1035}"/>
+              </a:ext>
+              <a:ext uri="{C183D7F6-B498-43B3-948B-1728B52AA6E4}">
+                <adec:decorative xmlns:adec="http://schemas.microsoft.com/office/drawing/2017/decorative" val="1"/>
+              </a:ext>
+            </a:extLst>
+          </p:cNvPr>
+          <p:cNvSpPr>
+            <a:spLocks noGrp="1" noRot="1" noChangeAspect="1" noMove="1" noResize="1" noEditPoints="1" noAdjustHandles="1" noChangeArrowheads="1" noChangeShapeType="1" noTextEdit="1"/>
+          </p:cNvSpPr>
+          <p:nvPr>
+            <p:extLst>
+              <p:ext uri="{386F3935-93C4-4BCD-93E2-E3B085C9AB24}">
+                <p16:designElem xmlns:p16="http://schemas.microsoft.com/office/powerpoint/2015/main" val="1"/>
+              </p:ext>
+            </p:extLst>
+          </p:nvPr>
+        </p:nvSpPr>
+        <p:spPr>
+          <a:xfrm rot="8100000">
+            <a:off x="626845" y="828962"/>
+            <a:ext cx="540000" cy="1080000"/>
+          </a:xfrm>
+          <a:prstGeom prst="ellipse">
+            <a:avLst/>
+          </a:prstGeom>
+          <a:gradFill>
+            <a:gsLst>
+              <a:gs pos="100000">
+                <a:schemeClr val="bg2">
+                  <a:lumMod val="90000"/>
+                  <a:lumOff val="10000"/>
+                </a:schemeClr>
+              </a:gs>
+              <a:gs pos="50000">
+                <a:schemeClr val="bg2">
+                  <a:lumMod val="95000"/>
+                  <a:lumOff val="5000"/>
+                </a:schemeClr>
+              </a:gs>
+            </a:gsLst>
+            <a:lin ang="5400000" scaled="0"/>
+          </a:gradFill>
+          <a:ln>
+            <a:noFill/>
+          </a:ln>
+          <a:effectLst>
+            <a:innerShdw blurRad="1270000" dist="2540000">
+              <a:schemeClr val="accent1">
+                <a:lumMod val="60000"/>
+                <a:lumOff val="40000"/>
+                <a:alpha val="0"/>
+              </a:schemeClr>
+            </a:innerShdw>
+          </a:effectLst>
+        </p:spPr>
+        <p:style>
+          <a:lnRef idx="2">
+            <a:schemeClr val="accent1">
+              <a:shade val="50000"/>
+            </a:schemeClr>
+          </a:lnRef>
+          <a:fillRef idx="1">
+            <a:schemeClr val="accent1"/>
+          </a:fillRef>
+          <a:effectRef idx="0">
+            <a:schemeClr val="accent1"/>
+          </a:effectRef>
+          <a:fontRef idx="minor">
+            <a:schemeClr val="lt1"/>
+          </a:fontRef>
+        </p:style>
+        <p:txBody>
+          <a:bodyPr rot="0" spcFirstLastPara="0" vertOverflow="overflow" horzOverflow="overflow" vert="horz" wrap="square" lIns="91440" tIns="45720" rIns="91440" bIns="45720" numCol="1" spcCol="0" rtlCol="0" fromWordArt="0" anchor="ctr" anchorCtr="0" forceAA="0" compatLnSpc="1">
+            <a:prstTxWarp prst="textNoShape">
+              <a:avLst/>
+            </a:prstTxWarp>
+            <a:noAutofit/>
+          </a:bodyPr>
+          <a:lstStyle/>
+          <a:p>
+            <a:pPr algn="ctr"/>
+            <a:endParaRPr lang="en-US"/>
+          </a:p>
+        </p:txBody>
+      </p:sp>
+      <p:sp>
+        <p:nvSpPr>
+          <p:cNvPr id="12" name="Oval 11">
+            <a:extLst>
+              <a:ext uri="{FF2B5EF4-FFF2-40B4-BE49-F238E27FC236}">
+                <a16:creationId xmlns:a16="http://schemas.microsoft.com/office/drawing/2014/main" id="{EF99ECAA-1F11-4937-BBA6-51935AB44C9D}"/>
+              </a:ext>
+              <a:ext uri="{C183D7F6-B498-43B3-948B-1728B52AA6E4}">
+                <adec:decorative xmlns:adec="http://schemas.microsoft.com/office/drawing/2017/decorative" val="1"/>
+              </a:ext>
+            </a:extLst>
+          </p:cNvPr>
+          <p:cNvSpPr>
+            <a:spLocks noGrp="1" noRot="1" noChangeAspect="1" noMove="1" noResize="1" noEditPoints="1" noAdjustHandles="1" noChangeArrowheads="1" noChangeShapeType="1" noTextEdit="1"/>
+          </p:cNvSpPr>
+          <p:nvPr>
+            <p:extLst>
+              <p:ext uri="{386F3935-93C4-4BCD-93E2-E3B085C9AB24}">
+                <p16:designElem xmlns:p16="http://schemas.microsoft.com/office/powerpoint/2015/main" val="1"/>
+              </p:ext>
+            </p:extLst>
+          </p:nvPr>
+        </p:nvSpPr>
+        <p:spPr>
+          <a:xfrm>
+            <a:off x="1800802" y="2472855"/>
+            <a:ext cx="360000" cy="360000"/>
+          </a:xfrm>
+          <a:prstGeom prst="ellipse">
+            <a:avLst/>
+          </a:prstGeom>
+          <a:gradFill flip="none" rotWithShape="1">
+            <a:gsLst>
+              <a:gs pos="100000">
+                <a:schemeClr val="bg2">
+                  <a:lumMod val="50000"/>
+                  <a:lumOff val="50000"/>
+                </a:schemeClr>
+              </a:gs>
+              <a:gs pos="60000">
+                <a:schemeClr val="bg2"/>
+              </a:gs>
+            </a:gsLst>
+            <a:path path="circle">
+              <a:fillToRect l="100000" b="100000"/>
+            </a:path>
+            <a:tileRect t="-100000" r="-100000"/>
+          </a:gradFill>
+          <a:ln>
+            <a:noFill/>
+          </a:ln>
+          <a:effectLst>
+            <a:innerShdw blurRad="127000" dist="63500" dir="2700000">
+              <a:schemeClr val="accent1">
+                <a:lumMod val="60000"/>
+                <a:lumOff val="40000"/>
+                <a:alpha val="20000"/>
+              </a:schemeClr>
+            </a:innerShdw>
+            <a:softEdge rad="0"/>
+          </a:effectLst>
+        </p:spPr>
+        <p:style>
+          <a:lnRef idx="2">
+            <a:schemeClr val="accent1">
+              <a:shade val="50000"/>
+            </a:schemeClr>
+          </a:lnRef>
+          <a:fillRef idx="1">
+            <a:schemeClr val="accent1"/>
+          </a:fillRef>
+          <a:effectRef idx="0">
+            <a:schemeClr val="accent1"/>
+          </a:effectRef>
+          <a:fontRef idx="minor">
+            <a:schemeClr val="lt1"/>
+          </a:fontRef>
+        </p:style>
+        <p:txBody>
+          <a:bodyPr rot="0" spcFirstLastPara="0" vertOverflow="overflow" horzOverflow="overflow" vert="horz" wrap="square" lIns="91440" tIns="45720" rIns="91440" bIns="45720" numCol="1" spcCol="0" rtlCol="0" fromWordArt="0" anchor="ctr" anchorCtr="0" forceAA="0" compatLnSpc="1">
+            <a:prstTxWarp prst="textNoShape">
+              <a:avLst/>
+            </a:prstTxWarp>
+            <a:noAutofit/>
+          </a:bodyPr>
+          <a:lstStyle/>
+          <a:p>
+            <a:pPr algn="ctr"/>
+            <a:endParaRPr lang="en-US"/>
+          </a:p>
+        </p:txBody>
+      </p:sp>
+      <p:grpSp>
+        <p:nvGrpSpPr>
+          <p:cNvPr id="14" name="Group 13">
+            <a:extLst>
+              <a:ext uri="{FF2B5EF4-FFF2-40B4-BE49-F238E27FC236}">
+                <a16:creationId xmlns:a16="http://schemas.microsoft.com/office/drawing/2014/main" id="{79DE9FAB-6BBA-4CFE-B67D-77B47F01ECA4}"/>
+              </a:ext>
+              <a:ext uri="{C183D7F6-B498-43B3-948B-1728B52AA6E4}">
+                <adec:decorative xmlns:adec="http://schemas.microsoft.com/office/drawing/2017/decorative" val="1"/>
+              </a:ext>
+            </a:extLst>
+          </p:cNvPr>
+          <p:cNvGrpSpPr>
+            <a:grpSpLocks noGrp="1" noUngrp="1" noRot="1" noChangeAspect="1" noMove="1" noResize="1"/>
+          </p:cNvGrpSpPr>
+          <p:nvPr>
+            <p:extLst>
+              <p:ext uri="{386F3935-93C4-4BCD-93E2-E3B085C9AB24}">
+                <p16:designElem xmlns:p16="http://schemas.microsoft.com/office/powerpoint/2015/main" val="1"/>
+              </p:ext>
+            </p:extLst>
+          </p:nvPr>
+        </p:nvGrpSpPr>
+        <p:grpSpPr>
+          <a:xfrm>
+            <a:off x="1329952" y="4524379"/>
+            <a:ext cx="1980001" cy="1363916"/>
+            <a:chOff x="4879602" y="3781429"/>
+            <a:chExt cx="1980001" cy="1363916"/>
+          </a:xfrm>
+        </p:grpSpPr>
+        <p:sp>
+          <p:nvSpPr>
+            <p:cNvPr id="15" name="Freeform: Shape 14">
+              <a:extLst>
+                <a:ext uri="{FF2B5EF4-FFF2-40B4-BE49-F238E27FC236}">
+                  <a16:creationId xmlns:a16="http://schemas.microsoft.com/office/drawing/2014/main" id="{79FAC916-D9BB-4794-81B4-7C47C67E850D}"/>
+                </a:ext>
+                <a:ext uri="{C183D7F6-B498-43B3-948B-1728B52AA6E4}">
+                  <adec:decorative xmlns:adec="http://schemas.microsoft.com/office/drawing/2017/decorative" val="1"/>
+                </a:ext>
+              </a:extLst>
+            </p:cNvPr>
+            <p:cNvSpPr>
+              <a:spLocks noChangeAspect="1"/>
+            </p:cNvSpPr>
+            <p:nvPr>
+              <p:extLst>
+                <p:ext uri="{386F3935-93C4-4BCD-93E2-E3B085C9AB24}">
+                  <p16:designElem xmlns:p16="http://schemas.microsoft.com/office/powerpoint/2015/main" val="1"/>
+                </p:ext>
+              </p:extLst>
+            </p:nvPr>
+          </p:nvSpPr>
+          <p:spPr>
+            <a:xfrm rot="18900000" flipV="1">
+              <a:off x="5005634" y="4191206"/>
+              <a:ext cx="1853969" cy="926985"/>
+            </a:xfrm>
+            <a:custGeom>
+              <a:avLst/>
+              <a:gdLst>
+                <a:gd name="connsiteX0" fmla="*/ 1329373 w 2658746"/>
+                <a:gd name="connsiteY0" fmla="*/ 0 h 1329373"/>
+                <a:gd name="connsiteX1" fmla="*/ 2658746 w 2658746"/>
+                <a:gd name="connsiteY1" fmla="*/ 1329373 h 1329373"/>
+                <a:gd name="connsiteX2" fmla="*/ 1994059 w 2658746"/>
+                <a:gd name="connsiteY2" fmla="*/ 1329373 h 1329373"/>
+                <a:gd name="connsiteX3" fmla="*/ 1329373 w 2658746"/>
+                <a:gd name="connsiteY3" fmla="*/ 664687 h 1329373"/>
+                <a:gd name="connsiteX4" fmla="*/ 664687 w 2658746"/>
+                <a:gd name="connsiteY4" fmla="*/ 1329373 h 1329373"/>
+                <a:gd name="connsiteX5" fmla="*/ 0 w 2658746"/>
+                <a:gd name="connsiteY5" fmla="*/ 1329373 h 1329373"/>
+                <a:gd name="connsiteX6" fmla="*/ 1329373 w 2658746"/>
+                <a:gd name="connsiteY6" fmla="*/ 0 h 1329373"/>
+              </a:gdLst>
+              <a:ahLst/>
+              <a:cxnLst>
+                <a:cxn ang="0">
+                  <a:pos x="connsiteX0" y="connsiteY0"/>
+                </a:cxn>
+                <a:cxn ang="0">
+                  <a:pos x="connsiteX1" y="connsiteY1"/>
+                </a:cxn>
+                <a:cxn ang="0">
+                  <a:pos x="connsiteX2" y="connsiteY2"/>
+                </a:cxn>
+                <a:cxn ang="0">
+                  <a:pos x="connsiteX3" y="connsiteY3"/>
+                </a:cxn>
+                <a:cxn ang="0">
+                  <a:pos x="connsiteX4" y="connsiteY4"/>
+                </a:cxn>
+                <a:cxn ang="0">
+                  <a:pos x="connsiteX5" y="connsiteY5"/>
+                </a:cxn>
+                <a:cxn ang="0">
+                  <a:pos x="connsiteX6" y="connsiteY6"/>
+                </a:cxn>
+              </a:cxnLst>
+              <a:rect l="l" t="t" r="r" b="b"/>
+              <a:pathLst>
+                <a:path w="2658746" h="1329373">
+                  <a:moveTo>
+                    <a:pt x="1329373" y="0"/>
+                  </a:moveTo>
+                  <a:cubicBezTo>
+                    <a:pt x="2063565" y="0"/>
+                    <a:pt x="2658746" y="595181"/>
+                    <a:pt x="2658746" y="1329373"/>
+                  </a:cubicBezTo>
+                  <a:lnTo>
+                    <a:pt x="1994059" y="1329373"/>
+                  </a:lnTo>
+                  <a:cubicBezTo>
+                    <a:pt x="1994059" y="962277"/>
+                    <a:pt x="1696469" y="664687"/>
+                    <a:pt x="1329373" y="664687"/>
+                  </a:cubicBezTo>
+                  <a:cubicBezTo>
+                    <a:pt x="962277" y="664687"/>
+                    <a:pt x="664687" y="962277"/>
+                    <a:pt x="664687" y="1329373"/>
+                  </a:cubicBezTo>
+                  <a:lnTo>
+                    <a:pt x="0" y="1329373"/>
+                  </a:lnTo>
+                  <a:cubicBezTo>
+                    <a:pt x="0" y="595181"/>
+                    <a:pt x="595181" y="0"/>
+                    <a:pt x="1329373" y="0"/>
+                  </a:cubicBezTo>
+                  <a:close/>
+                </a:path>
+              </a:pathLst>
+            </a:custGeom>
+            <a:solidFill>
+              <a:schemeClr val="bg2"/>
+            </a:solidFill>
+            <a:ln>
+              <a:noFill/>
+            </a:ln>
+            <a:effectLst>
+              <a:innerShdw blurRad="254000" dist="50800" dir="16200000">
+                <a:schemeClr val="accent1">
+                  <a:lumMod val="40000"/>
+                  <a:lumOff val="60000"/>
+                  <a:alpha val="40000"/>
+                </a:schemeClr>
+              </a:innerShdw>
+            </a:effectLst>
+          </p:spPr>
+          <p:style>
+            <a:lnRef idx="2">
+              <a:schemeClr val="accent1">
+                <a:shade val="50000"/>
+              </a:schemeClr>
+            </a:lnRef>
+            <a:fillRef idx="1">
+              <a:schemeClr val="accent1"/>
+            </a:fillRef>
+            <a:effectRef idx="0">
+              <a:schemeClr val="accent1"/>
+            </a:effectRef>
+            <a:fontRef idx="minor">
+              <a:schemeClr val="lt1"/>
+            </a:fontRef>
+          </p:style>
+          <p:txBody>
+            <a:bodyPr rtlCol="0" anchor="ctr"/>
+            <a:lstStyle/>
+            <a:p>
+              <a:pPr algn="ctr"/>
+              <a:endParaRPr lang="en-US"/>
+            </a:p>
+          </p:txBody>
+        </p:sp>
+        <p:sp>
+          <p:nvSpPr>
+            <p:cNvPr id="16" name="Freeform: Shape 15">
+              <a:extLst>
+                <a:ext uri="{FF2B5EF4-FFF2-40B4-BE49-F238E27FC236}">
+                  <a16:creationId xmlns:a16="http://schemas.microsoft.com/office/drawing/2014/main" id="{B5CA2231-7A65-4D16-8400-A210CC41DB73}"/>
+                </a:ext>
+                <a:ext uri="{C183D7F6-B498-43B3-948B-1728B52AA6E4}">
+                  <adec:decorative xmlns:adec="http://schemas.microsoft.com/office/drawing/2017/decorative" val="1"/>
+                </a:ext>
+              </a:extLst>
+            </p:cNvPr>
+            <p:cNvSpPr>
+              <a:spLocks noChangeAspect="1"/>
+            </p:cNvSpPr>
+            <p:nvPr>
+              <p:extLst>
+                <p:ext uri="{386F3935-93C4-4BCD-93E2-E3B085C9AB24}">
+                  <p16:designElem xmlns:p16="http://schemas.microsoft.com/office/powerpoint/2015/main" val="1"/>
+                </p:ext>
+              </p:extLst>
+            </p:nvPr>
+          </p:nvSpPr>
+          <p:spPr>
+            <a:xfrm rot="18900000" flipV="1">
+              <a:off x="4957101" y="4052255"/>
+              <a:ext cx="1853969" cy="1093090"/>
+            </a:xfrm>
+            <a:custGeom>
+              <a:avLst/>
+              <a:gdLst>
+                <a:gd name="connsiteX0" fmla="*/ 1329373 w 2658746"/>
+                <a:gd name="connsiteY0" fmla="*/ 0 h 1329373"/>
+                <a:gd name="connsiteX1" fmla="*/ 2658746 w 2658746"/>
+                <a:gd name="connsiteY1" fmla="*/ 1329373 h 1329373"/>
+                <a:gd name="connsiteX2" fmla="*/ 1994059 w 2658746"/>
+                <a:gd name="connsiteY2" fmla="*/ 1329373 h 1329373"/>
+                <a:gd name="connsiteX3" fmla="*/ 1329373 w 2658746"/>
+                <a:gd name="connsiteY3" fmla="*/ 664687 h 1329373"/>
+                <a:gd name="connsiteX4" fmla="*/ 664687 w 2658746"/>
+                <a:gd name="connsiteY4" fmla="*/ 1329373 h 1329373"/>
+                <a:gd name="connsiteX5" fmla="*/ 0 w 2658746"/>
+                <a:gd name="connsiteY5" fmla="*/ 1329373 h 1329373"/>
+                <a:gd name="connsiteX6" fmla="*/ 1329373 w 2658746"/>
+                <a:gd name="connsiteY6" fmla="*/ 0 h 1329373"/>
+              </a:gdLst>
+              <a:ahLst/>
+              <a:cxnLst>
+                <a:cxn ang="0">
+                  <a:pos x="connsiteX0" y="connsiteY0"/>
+                </a:cxn>
+                <a:cxn ang="0">
+                  <a:pos x="connsiteX1" y="connsiteY1"/>
+                </a:cxn>
+                <a:cxn ang="0">
+                  <a:pos x="connsiteX2" y="connsiteY2"/>
+                </a:cxn>
+                <a:cxn ang="0">
+                  <a:pos x="connsiteX3" y="connsiteY3"/>
+                </a:cxn>
+                <a:cxn ang="0">
+                  <a:pos x="connsiteX4" y="connsiteY4"/>
+                </a:cxn>
+                <a:cxn ang="0">
+                  <a:pos x="connsiteX5" y="connsiteY5"/>
+                </a:cxn>
+                <a:cxn ang="0">
+                  <a:pos x="connsiteX6" y="connsiteY6"/>
+                </a:cxn>
+              </a:cxnLst>
+              <a:rect l="l" t="t" r="r" b="b"/>
+              <a:pathLst>
+                <a:path w="2658746" h="1329373">
+                  <a:moveTo>
+                    <a:pt x="1329373" y="0"/>
+                  </a:moveTo>
+                  <a:cubicBezTo>
+                    <a:pt x="2063565" y="0"/>
+                    <a:pt x="2658746" y="595181"/>
+                    <a:pt x="2658746" y="1329373"/>
+                  </a:cubicBezTo>
+                  <a:lnTo>
+                    <a:pt x="1994059" y="1329373"/>
+                  </a:lnTo>
+                  <a:cubicBezTo>
+                    <a:pt x="1994059" y="962277"/>
+                    <a:pt x="1696469" y="664687"/>
+                    <a:pt x="1329373" y="664687"/>
+                  </a:cubicBezTo>
+                  <a:cubicBezTo>
+                    <a:pt x="962277" y="664687"/>
+                    <a:pt x="664687" y="962277"/>
+                    <a:pt x="664687" y="1329373"/>
+                  </a:cubicBezTo>
+                  <a:lnTo>
+                    <a:pt x="0" y="1329373"/>
+                  </a:lnTo>
+                  <a:cubicBezTo>
+                    <a:pt x="0" y="595181"/>
+                    <a:pt x="595181" y="0"/>
+                    <a:pt x="1329373" y="0"/>
+                  </a:cubicBezTo>
+                  <a:close/>
+                </a:path>
+              </a:pathLst>
+            </a:custGeom>
+            <a:solidFill>
+              <a:schemeClr val="bg2">
+                <a:lumMod val="50000"/>
+                <a:lumOff val="50000"/>
+                <a:alpha val="40000"/>
+              </a:schemeClr>
+            </a:solidFill>
+            <a:ln>
+              <a:noFill/>
+            </a:ln>
+            <a:effectLst>
+              <a:softEdge rad="190500"/>
+            </a:effectLst>
+          </p:spPr>
+          <p:style>
+            <a:lnRef idx="2">
+              <a:schemeClr val="accent1">
+                <a:shade val="50000"/>
+              </a:schemeClr>
+            </a:lnRef>
+            <a:fillRef idx="1">
+              <a:schemeClr val="accent1"/>
+            </a:fillRef>
+            <a:effectRef idx="0">
+              <a:schemeClr val="accent1"/>
+            </a:effectRef>
+            <a:fontRef idx="minor">
+              <a:schemeClr val="lt1"/>
+            </a:fontRef>
+          </p:style>
+          <p:txBody>
+            <a:bodyPr rtlCol="0" anchor="ctr"/>
+            <a:lstStyle/>
+            <a:p>
+              <a:pPr algn="ctr"/>
+              <a:endParaRPr lang="en-US">
+                <a:solidFill>
+                  <a:schemeClr val="tx1"/>
+                </a:solidFill>
+              </a:endParaRPr>
+            </a:p>
+          </p:txBody>
+        </p:sp>
+        <p:sp>
+          <p:nvSpPr>
+            <p:cNvPr id="17" name="Oval 16">
+              <a:extLst>
+                <a:ext uri="{FF2B5EF4-FFF2-40B4-BE49-F238E27FC236}">
+                  <a16:creationId xmlns:a16="http://schemas.microsoft.com/office/drawing/2014/main" id="{4B089C8C-B82B-4704-88E2-E857A5E21529}"/>
+                </a:ext>
+                <a:ext uri="{C183D7F6-B498-43B3-948B-1728B52AA6E4}">
+                  <adec:decorative xmlns:adec="http://schemas.microsoft.com/office/drawing/2017/decorative" val="1"/>
+                </a:ext>
+              </a:extLst>
+            </p:cNvPr>
+            <p:cNvSpPr/>
+            <p:nvPr>
+              <p:extLst>
+                <p:ext uri="{386F3935-93C4-4BCD-93E2-E3B085C9AB24}">
+                  <p16:designElem xmlns:p16="http://schemas.microsoft.com/office/powerpoint/2015/main" val="1"/>
+                </p:ext>
+              </p:extLst>
+            </p:nvPr>
+          </p:nvSpPr>
+          <p:spPr>
+            <a:xfrm rot="13500000" flipV="1">
+              <a:off x="6040374" y="3601683"/>
+              <a:ext cx="107098" cy="466589"/>
+            </a:xfrm>
+            <a:prstGeom prst="ellipse">
+              <a:avLst/>
+            </a:prstGeom>
+            <a:solidFill>
+              <a:schemeClr val="bg2">
+                <a:lumMod val="90000"/>
+                <a:lumOff val="10000"/>
+              </a:schemeClr>
+            </a:solidFill>
+            <a:ln>
+              <a:noFill/>
+            </a:ln>
+            <a:effectLst>
+              <a:innerShdw blurRad="63500" dist="2540000">
+                <a:schemeClr val="accent1">
+                  <a:lumMod val="60000"/>
+                  <a:lumOff val="40000"/>
+                  <a:alpha val="0"/>
+                </a:schemeClr>
+              </a:innerShdw>
+            </a:effectLst>
+          </p:spPr>
+          <p:style>
+            <a:lnRef idx="2">
+              <a:schemeClr val="accent1">
+                <a:shade val="50000"/>
+              </a:schemeClr>
+            </a:lnRef>
+            <a:fillRef idx="1">
+              <a:schemeClr val="accent1"/>
+            </a:fillRef>
+            <a:effectRef idx="0">
+              <a:schemeClr val="accent1"/>
+            </a:effectRef>
+            <a:fontRef idx="minor">
+              <a:schemeClr val="lt1"/>
+            </a:fontRef>
+          </p:style>
+          <p:txBody>
+            <a:bodyPr rot="0" spcFirstLastPara="0" vertOverflow="overflow" horzOverflow="overflow" vert="horz" wrap="square" lIns="91440" tIns="45720" rIns="91440" bIns="45720" numCol="1" spcCol="0" rtlCol="0" fromWordArt="0" anchor="ctr" anchorCtr="0" forceAA="0" compatLnSpc="1">
+              <a:prstTxWarp prst="textNoShape">
+                <a:avLst/>
+              </a:prstTxWarp>
+              <a:noAutofit/>
+            </a:bodyPr>
+            <a:lstStyle/>
+            <a:p>
+              <a:pPr algn="ctr"/>
+              <a:endParaRPr lang="en-US"/>
+            </a:p>
+          </p:txBody>
+        </p:sp>
+        <p:sp>
+          <p:nvSpPr>
+            <p:cNvPr id="18" name="Oval 17">
+              <a:extLst>
+                <a:ext uri="{FF2B5EF4-FFF2-40B4-BE49-F238E27FC236}">
+                  <a16:creationId xmlns:a16="http://schemas.microsoft.com/office/drawing/2014/main" id="{434B90C8-5B4D-456E-AD99-80EF748FDD72}"/>
+                </a:ext>
+                <a:ext uri="{C183D7F6-B498-43B3-948B-1728B52AA6E4}">
+                  <adec:decorative xmlns:adec="http://schemas.microsoft.com/office/drawing/2017/decorative" val="1"/>
+                </a:ext>
+              </a:extLst>
+            </p:cNvPr>
+            <p:cNvSpPr/>
+            <p:nvPr>
+              <p:extLst>
+                <p:ext uri="{386F3935-93C4-4BCD-93E2-E3B085C9AB24}">
+                  <p16:designElem xmlns:p16="http://schemas.microsoft.com/office/powerpoint/2015/main" val="1"/>
+                </p:ext>
+              </p:extLst>
+            </p:nvPr>
+          </p:nvSpPr>
+          <p:spPr>
+            <a:xfrm rot="13500000" flipV="1">
+              <a:off x="5059348" y="4582709"/>
+              <a:ext cx="107098" cy="466589"/>
+            </a:xfrm>
+            <a:prstGeom prst="ellipse">
+              <a:avLst/>
+            </a:prstGeom>
+            <a:solidFill>
+              <a:schemeClr val="bg2">
+                <a:lumMod val="90000"/>
+                <a:lumOff val="10000"/>
+              </a:schemeClr>
+            </a:solidFill>
+            <a:ln>
+              <a:noFill/>
+            </a:ln>
+            <a:effectLst>
+              <a:innerShdw blurRad="63500" dist="2540000">
+                <a:schemeClr val="accent1">
+                  <a:lumMod val="60000"/>
+                  <a:lumOff val="40000"/>
+                  <a:alpha val="0"/>
+                </a:schemeClr>
+              </a:innerShdw>
+            </a:effectLst>
+          </p:spPr>
+          <p:style>
+            <a:lnRef idx="2">
+              <a:schemeClr val="accent1">
+                <a:shade val="50000"/>
+              </a:schemeClr>
+            </a:lnRef>
+            <a:fillRef idx="1">
+              <a:schemeClr val="accent1"/>
+            </a:fillRef>
+            <a:effectRef idx="0">
+              <a:schemeClr val="accent1"/>
+            </a:effectRef>
+            <a:fontRef idx="minor">
+              <a:schemeClr val="lt1"/>
+            </a:fontRef>
+          </p:style>
+          <p:txBody>
+            <a:bodyPr rot="0" spcFirstLastPara="0" vertOverflow="overflow" horzOverflow="overflow" vert="horz" wrap="square" lIns="91440" tIns="45720" rIns="91440" bIns="45720" numCol="1" spcCol="0" rtlCol="0" fromWordArt="0" anchor="ctr" anchorCtr="0" forceAA="0" compatLnSpc="1">
+              <a:prstTxWarp prst="textNoShape">
+                <a:avLst/>
+              </a:prstTxWarp>
+              <a:noAutofit/>
+            </a:bodyPr>
+            <a:lstStyle/>
+            <a:p>
+              <a:pPr algn="ctr"/>
+              <a:endParaRPr lang="en-US"/>
+            </a:p>
+          </p:txBody>
+        </p:sp>
+      </p:grpSp>
+      <p:sp useBgFill="1">
+        <p:nvSpPr>
+          <p:cNvPr id="20" name="Rectangle 19">
+            <a:extLst>
+              <a:ext uri="{FF2B5EF4-FFF2-40B4-BE49-F238E27FC236}">
+                <a16:creationId xmlns:a16="http://schemas.microsoft.com/office/drawing/2014/main" id="{1DB043B4-68C6-45B9-82AC-A5800EADB8DB}"/>
+              </a:ext>
+              <a:ext uri="{C183D7F6-B498-43B3-948B-1728B52AA6E4}">
+                <adec:decorative xmlns:adec="http://schemas.microsoft.com/office/drawing/2017/decorative" val="1"/>
+              </a:ext>
+            </a:extLst>
+          </p:cNvPr>
+          <p:cNvSpPr>
+            <a:spLocks noGrp="1" noRot="1" noChangeAspect="1" noMove="1" noResize="1" noEditPoints="1" noAdjustHandles="1" noChangeArrowheads="1" noChangeShapeType="1" noTextEdit="1"/>
+          </p:cNvSpPr>
+          <p:nvPr>
+            <p:extLst>
+              <p:ext uri="{386F3935-93C4-4BCD-93E2-E3B085C9AB24}">
+                <p16:designElem xmlns:p16="http://schemas.microsoft.com/office/powerpoint/2015/main" val="1"/>
+              </p:ext>
+            </p:extLst>
+          </p:nvPr>
+        </p:nvSpPr>
+        <p:spPr>
+          <a:xfrm>
+            <a:off x="0" y="0"/>
+            <a:ext cx="12192000" cy="6858000"/>
+          </a:xfrm>
+          <a:prstGeom prst="rect">
+            <a:avLst/>
+          </a:prstGeom>
+          <a:ln w="12700" cap="flat" cmpd="sng" algn="ctr">
+            <a:noFill/>
+            <a:prstDash val="solid"/>
+            <a:miter lim="800000"/>
+          </a:ln>
+          <a:effectLst/>
+          <a:extLst>
+            <a:ext uri="{91240B29-F687-4F45-9708-019B960494DF}">
+              <a14:hiddenLine xmlns:a14="http://schemas.microsoft.com/office/drawing/2010/main" w="12700" cap="flat" cmpd="sng" algn="ctr">
+                <a:solidFill>
+                  <a:schemeClr val="accent1">
+                    <a:shade val="50000"/>
+                  </a:schemeClr>
+                </a:solidFill>
+                <a:prstDash val="solid"/>
+                <a:miter lim="800000"/>
+              </a14:hiddenLine>
+            </a:ext>
+          </a:extLst>
+        </p:spPr>
+        <p:style>
+          <a:lnRef idx="2">
+            <a:schemeClr val="accent1">
+              <a:shade val="50000"/>
+            </a:schemeClr>
+          </a:lnRef>
+          <a:fillRef idx="1">
+            <a:schemeClr val="accent1"/>
+          </a:fillRef>
+          <a:effectRef idx="0">
+            <a:schemeClr val="accent1"/>
+          </a:effectRef>
+          <a:fontRef idx="minor">
+            <a:schemeClr val="lt1"/>
+          </a:fontRef>
+        </p:style>
+        <p:txBody>
+          <a:bodyPr rtlCol="0" anchor="ctr"/>
+          <a:lstStyle/>
+          <a:p>
+            <a:pPr algn="ctr"/>
+            <a:endParaRPr lang="en-US"/>
+          </a:p>
+        </p:txBody>
+      </p:sp>
+      <p:pic>
+        <p:nvPicPr>
+          <p:cNvPr id="4" name="Picture 3" descr="A picture containing cat&#10;&#10;Description automatically generated">
+            <a:extLst>
+              <a:ext uri="{FF2B5EF4-FFF2-40B4-BE49-F238E27FC236}">
+                <a16:creationId xmlns:a16="http://schemas.microsoft.com/office/drawing/2014/main" id="{9E0AEC90-1EB5-466B-931B-8F6E9FF6058E}"/>
+              </a:ext>
+            </a:extLst>
+          </p:cNvPr>
+          <p:cNvPicPr>
+            <a:picLocks noChangeAspect="1"/>
+          </p:cNvPicPr>
+          <p:nvPr/>
+        </p:nvPicPr>
+        <p:blipFill rotWithShape="1">
+          <a:blip r:embed="rId3"/>
+          <a:srcRect t="15730"/>
+          <a:stretch/>
+        </p:blipFill>
+        <p:spPr>
+          <a:xfrm>
+            <a:off x="-2" y="7449"/>
+            <a:ext cx="12191980" cy="6858000"/>
+          </a:xfrm>
+          <a:custGeom>
+            <a:avLst/>
+            <a:gdLst/>
+            <a:ahLst/>
+            <a:cxnLst/>
+            <a:rect l="l" t="t" r="r" b="b"/>
+            <a:pathLst>
+              <a:path w="12192000" h="6858000">
+                <a:moveTo>
+                  <a:pt x="0" y="0"/>
+                </a:moveTo>
+                <a:lnTo>
+                  <a:pt x="12192000" y="0"/>
+                </a:lnTo>
+                <a:lnTo>
+                  <a:pt x="12192000" y="6858000"/>
+                </a:lnTo>
+                <a:lnTo>
+                  <a:pt x="0" y="6858000"/>
+                </a:lnTo>
+                <a:close/>
+              </a:path>
+            </a:pathLst>
+          </a:custGeom>
+        </p:spPr>
+      </p:pic>
+      <p:sp>
+        <p:nvSpPr>
+          <p:cNvPr id="22" name="Rectangle 21">
+            <a:extLst>
+              <a:ext uri="{FF2B5EF4-FFF2-40B4-BE49-F238E27FC236}">
+                <a16:creationId xmlns:a16="http://schemas.microsoft.com/office/drawing/2014/main" id="{AD4EA4DF-0E7C-4098-86F6-7D0ACAEFC0BF}"/>
+              </a:ext>
+              <a:ext uri="{C183D7F6-B498-43B3-948B-1728B52AA6E4}">
+                <adec:decorative xmlns:adec="http://schemas.microsoft.com/office/drawing/2017/decorative" val="1"/>
+              </a:ext>
+            </a:extLst>
+          </p:cNvPr>
+          <p:cNvSpPr>
+            <a:spLocks noGrp="1" noRot="1" noChangeAspect="1" noMove="1" noResize="1" noEditPoints="1" noAdjustHandles="1" noChangeArrowheads="1" noChangeShapeType="1" noTextEdit="1"/>
+          </p:cNvSpPr>
+          <p:nvPr>
+            <p:extLst>
+              <p:ext uri="{386F3935-93C4-4BCD-93E2-E3B085C9AB24}">
+                <p16:designElem xmlns:p16="http://schemas.microsoft.com/office/powerpoint/2015/main" val="1"/>
+              </p:ext>
+            </p:extLst>
+          </p:nvPr>
+        </p:nvSpPr>
+        <p:spPr>
+          <a:xfrm rot="10800000">
+            <a:off x="0" y="0"/>
+            <a:ext cx="7859713" cy="6857998"/>
+          </a:xfrm>
+          <a:prstGeom prst="rect">
+            <a:avLst/>
+          </a:prstGeom>
+          <a:gradFill flip="none" rotWithShape="1">
+            <a:gsLst>
+              <a:gs pos="50000">
+                <a:schemeClr val="bg2">
+                  <a:alpha val="60000"/>
+                </a:schemeClr>
+              </a:gs>
+              <a:gs pos="0">
+                <a:schemeClr val="bg2">
+                  <a:alpha val="0"/>
+                </a:schemeClr>
+              </a:gs>
+            </a:gsLst>
+            <a:lin ang="0" scaled="0"/>
+            <a:tileRect/>
+          </a:gradFill>
+          <a:ln>
+            <a:noFill/>
+          </a:ln>
+        </p:spPr>
+        <p:style>
+          <a:lnRef idx="2">
+            <a:schemeClr val="accent1">
+              <a:shade val="50000"/>
+            </a:schemeClr>
+          </a:lnRef>
+          <a:fillRef idx="1">
+            <a:schemeClr val="accent1"/>
+          </a:fillRef>
+          <a:effectRef idx="0">
+            <a:schemeClr val="accent1"/>
+          </a:effectRef>
+          <a:fontRef idx="minor">
+            <a:schemeClr val="lt1"/>
+          </a:fontRef>
+        </p:style>
+        <p:txBody>
+          <a:bodyPr rtlCol="0" anchor="ctr"/>
+          <a:lstStyle/>
+          <a:p>
+            <a:pPr algn="ctr"/>
+            <a:endParaRPr lang="en-US"/>
+          </a:p>
+        </p:txBody>
+      </p:sp>
+      <p:sp>
+        <p:nvSpPr>
+          <p:cNvPr id="2" name="Title 1">
+            <a:extLst>
+              <a:ext uri="{FF2B5EF4-FFF2-40B4-BE49-F238E27FC236}">
+                <a16:creationId xmlns:a16="http://schemas.microsoft.com/office/drawing/2014/main" id="{F71EC7A2-BE12-4194-AED0-9C56FED2A505}"/>
+              </a:ext>
+            </a:extLst>
+          </p:cNvPr>
+          <p:cNvSpPr>
+            <a:spLocks noGrp="1"/>
+          </p:cNvSpPr>
+          <p:nvPr>
+            <p:ph type="title"/>
+          </p:nvPr>
+        </p:nvSpPr>
+        <p:spPr>
+          <a:xfrm>
+            <a:off x="550864" y="549275"/>
+            <a:ext cx="3565524" cy="2887174"/>
+          </a:xfrm>
+        </p:spPr>
+        <p:txBody>
+          <a:bodyPr vert="horz" wrap="square" lIns="0" tIns="0" rIns="0" bIns="0" rtlCol="0" anchor="b" anchorCtr="0">
+            <a:normAutofit/>
+          </a:bodyPr>
+          <a:lstStyle/>
+          <a:p>
+            <a:pPr>
+              <a:lnSpc>
+                <a:spcPct val="100000"/>
+              </a:lnSpc>
+            </a:pPr>
+            <a:r>
+              <a:rPr lang="en-US" kern="1200" dirty="0">
+                <a:solidFill>
+                  <a:schemeClr val="tx1"/>
+                </a:solidFill>
+                <a:latin typeface="+mj-lt"/>
+                <a:ea typeface="+mj-ea"/>
+                <a:cs typeface="+mj-cs"/>
+              </a:rPr>
+              <a:t>Appendix</a:t>
+            </a:r>
+          </a:p>
+        </p:txBody>
+      </p:sp>
+      <p:sp>
+        <p:nvSpPr>
+          <p:cNvPr id="24" name="Rectangle 23">
+            <a:extLst>
+              <a:ext uri="{FF2B5EF4-FFF2-40B4-BE49-F238E27FC236}">
+                <a16:creationId xmlns:a16="http://schemas.microsoft.com/office/drawing/2014/main" id="{FE05BC49-0F00-4C85-9AF5-A0CC5B39C8D2}"/>
+              </a:ext>
+              <a:ext uri="{C183D7F6-B498-43B3-948B-1728B52AA6E4}">
+                <adec:decorative xmlns:adec="http://schemas.microsoft.com/office/drawing/2017/decorative" val="1"/>
+              </a:ext>
+            </a:extLst>
+          </p:cNvPr>
+          <p:cNvSpPr>
+            <a:spLocks noGrp="1" noRot="1" noChangeAspect="1" noMove="1" noResize="1" noEditPoints="1" noAdjustHandles="1" noChangeArrowheads="1" noChangeShapeType="1" noTextEdit="1"/>
+          </p:cNvSpPr>
+          <p:nvPr>
+            <p:extLst>
+              <p:ext uri="{386F3935-93C4-4BCD-93E2-E3B085C9AB24}">
+                <p16:designElem xmlns:p16="http://schemas.microsoft.com/office/powerpoint/2015/main" val="1"/>
+              </p:ext>
+            </p:extLst>
+          </p:nvPr>
+        </p:nvSpPr>
+        <p:spPr>
+          <a:xfrm>
+            <a:off x="0" y="5773729"/>
+            <a:ext cx="12192000" cy="1084271"/>
+          </a:xfrm>
+          <a:prstGeom prst="rect">
+            <a:avLst/>
+          </a:prstGeom>
+          <a:gradFill flip="none" rotWithShape="1">
+            <a:gsLst>
+              <a:gs pos="90000">
+                <a:schemeClr val="bg2">
+                  <a:alpha val="60000"/>
+                </a:schemeClr>
+              </a:gs>
+              <a:gs pos="28000">
+                <a:schemeClr val="bg2">
+                  <a:alpha val="0"/>
+                </a:schemeClr>
+              </a:gs>
+            </a:gsLst>
+            <a:lin ang="5400000" scaled="0"/>
+            <a:tileRect/>
+          </a:gradFill>
+          <a:ln>
+            <a:noFill/>
+          </a:ln>
+        </p:spPr>
+        <p:style>
+          <a:lnRef idx="2">
+            <a:schemeClr val="accent1">
+              <a:shade val="50000"/>
+            </a:schemeClr>
+          </a:lnRef>
+          <a:fillRef idx="1">
+            <a:schemeClr val="accent1"/>
+          </a:fillRef>
+          <a:effectRef idx="0">
+            <a:schemeClr val="accent1"/>
+          </a:effectRef>
+          <a:fontRef idx="minor">
+            <a:schemeClr val="lt1"/>
+          </a:fontRef>
+        </p:style>
+        <p:txBody>
+          <a:bodyPr rtlCol="0" anchor="ctr"/>
+          <a:lstStyle/>
+          <a:p>
+            <a:pPr algn="ctr"/>
+            <a:endParaRPr lang="en-US"/>
+          </a:p>
+        </p:txBody>
+      </p:sp>
+      <p:sp>
+        <p:nvSpPr>
+          <p:cNvPr id="19" name="TextBox 18">
+            <a:extLst>
+              <a:ext uri="{FF2B5EF4-FFF2-40B4-BE49-F238E27FC236}">
+                <a16:creationId xmlns:a16="http://schemas.microsoft.com/office/drawing/2014/main" id="{A4AED2BF-4F71-4DBC-AF5E-8ECE1418605D}"/>
+              </a:ext>
+            </a:extLst>
+          </p:cNvPr>
+          <p:cNvSpPr txBox="1"/>
+          <p:nvPr/>
+        </p:nvSpPr>
+        <p:spPr>
+          <a:xfrm>
+            <a:off x="4116388" y="1480054"/>
+            <a:ext cx="6221626" cy="461665"/>
+          </a:xfrm>
+          <a:prstGeom prst="rect">
+            <a:avLst/>
+          </a:prstGeom>
+          <a:noFill/>
+        </p:spPr>
+        <p:txBody>
+          <a:bodyPr wrap="square">
+            <a:spAutoFit/>
+          </a:bodyPr>
+          <a:lstStyle/>
+          <a:p>
+            <a:r>
+              <a:rPr lang="en-CA" sz="2400" dirty="0">
+                <a:solidFill>
+                  <a:schemeClr val="bg1"/>
+                </a:solidFill>
+                <a:hlinkClick r:id="rId4">
+                  <a:extLst>
+                    <a:ext uri="{A12FA001-AC4F-418D-AE19-62706E023703}">
+                      <ahyp:hlinkClr xmlns:ahyp="http://schemas.microsoft.com/office/drawing/2018/hyperlinkcolor" val="tx"/>
+                    </a:ext>
+                  </a:extLst>
+                </a:hlinkClick>
+              </a:rPr>
+              <a:t>https://azure.microsoft.com/en-us/free/students/</a:t>
+            </a:r>
+            <a:endParaRPr lang="en-CA" sz="2400" dirty="0">
+              <a:solidFill>
+                <a:schemeClr val="bg1"/>
+              </a:solidFill>
+            </a:endParaRPr>
+          </a:p>
+        </p:txBody>
+      </p:sp>
+      <p:sp>
+        <p:nvSpPr>
+          <p:cNvPr id="5" name="TextBox 4">
+            <a:extLst>
+              <a:ext uri="{FF2B5EF4-FFF2-40B4-BE49-F238E27FC236}">
+                <a16:creationId xmlns:a16="http://schemas.microsoft.com/office/drawing/2014/main" id="{7A27EB4D-7ECC-4C37-911F-527689C74615}"/>
+              </a:ext>
+            </a:extLst>
+          </p:cNvPr>
+          <p:cNvSpPr txBox="1"/>
+          <p:nvPr/>
+        </p:nvSpPr>
+        <p:spPr>
+          <a:xfrm>
+            <a:off x="4116388" y="1080991"/>
+            <a:ext cx="4571593" cy="400110"/>
+          </a:xfrm>
+          <a:prstGeom prst="rect">
+            <a:avLst/>
+          </a:prstGeom>
+          <a:noFill/>
+        </p:spPr>
+        <p:txBody>
+          <a:bodyPr wrap="square" rtlCol="0">
+            <a:spAutoFit/>
+          </a:bodyPr>
+          <a:lstStyle/>
+          <a:p>
+            <a:r>
+              <a:rPr lang="en-CA" sz="2000" dirty="0"/>
+              <a:t>Activate student account-</a:t>
+            </a:r>
+          </a:p>
+        </p:txBody>
+      </p:sp>
+    </p:spTree>
+    <p:extLst>
+      <p:ext uri="{BB962C8B-B14F-4D97-AF65-F5344CB8AC3E}">
+        <p14:creationId xmlns:p14="http://schemas.microsoft.com/office/powerpoint/2010/main" val="2525740388"/>
       </p:ext>
     </p:extLst>
   </p:cSld>
@@ -25982,7 +27610,7 @@
           <a:lstStyle/>
           <a:p>
             <a:pPr algn="ctr"/>
-            <a:endParaRPr lang="en-US"/>
+            <a:endParaRPr lang="en-US" dirty="0"/>
           </a:p>
         </p:txBody>
       </p:sp>
@@ -26015,7 +27643,7 @@
           <a:lstStyle/>
           <a:p>
             <a:r>
-              <a:rPr lang="en-US"/>
+              <a:rPr lang="en-US" dirty="0"/>
               <a:t>What will you learn?</a:t>
             </a:r>
           </a:p>
@@ -26084,7 +27712,7 @@
           <a:lstStyle/>
           <a:p>
             <a:pPr algn="ctr"/>
-            <a:endParaRPr lang="en-US"/>
+            <a:endParaRPr lang="en-US" dirty="0"/>
           </a:p>
         </p:txBody>
       </p:sp>
@@ -26943,7 +28571,7 @@
           <a:lstStyle/>
           <a:p>
             <a:pPr algn="ctr"/>
-            <a:endParaRPr lang="en-US"/>
+            <a:endParaRPr lang="en-US" dirty="0"/>
           </a:p>
         </p:txBody>
       </p:sp>
@@ -27045,7 +28673,7 @@
           <a:lstStyle/>
           <a:p>
             <a:pPr algn="ctr"/>
-            <a:endParaRPr lang="en-US"/>
+            <a:endParaRPr lang="en-US" dirty="0"/>
           </a:p>
         </p:txBody>
       </p:sp>
@@ -27190,7 +28818,7 @@
           <a:lstStyle/>
           <a:p>
             <a:pPr algn="ctr"/>
-            <a:endParaRPr lang="en-US"/>
+            <a:endParaRPr lang="en-US" dirty="0"/>
           </a:p>
         </p:txBody>
       </p:sp>
@@ -27487,7 +29115,7 @@
             <a:lstStyle/>
             <a:p>
               <a:pPr algn="ctr"/>
-              <a:endParaRPr lang="en-US"/>
+              <a:endParaRPr lang="en-US" dirty="0"/>
             </a:p>
           </p:txBody>
         </p:sp>
@@ -27565,7 +29193,7 @@
             <a:lstStyle/>
             <a:p>
               <a:pPr algn="ctr"/>
-              <a:endParaRPr lang="en-US"/>
+              <a:endParaRPr lang="en-US" dirty="0"/>
             </a:p>
           </p:txBody>
         </p:sp>
@@ -27880,7 +29508,7 @@
           <a:lstStyle/>
           <a:p>
             <a:pPr algn="ctr"/>
-            <a:endParaRPr lang="en-US"/>
+            <a:endParaRPr lang="en-US" dirty="0"/>
           </a:p>
         </p:txBody>
       </p:sp>
@@ -27994,7 +29622,7 @@
           <a:lstStyle/>
           <a:p>
             <a:pPr algn="ctr"/>
-            <a:endParaRPr lang="en-US"/>
+            <a:endParaRPr lang="en-US" dirty="0"/>
           </a:p>
         </p:txBody>
       </p:sp>
@@ -28096,7 +29724,7 @@
           <a:lstStyle/>
           <a:p>
             <a:pPr algn="ctr"/>
-            <a:endParaRPr lang="en-US"/>
+            <a:endParaRPr lang="en-US" dirty="0"/>
           </a:p>
         </p:txBody>
       </p:sp>

</xml_diff>